<commit_message>
added an online tree viewer
</commit_message>
<xml_diff>
--- a/REST/REST_workshop_compara_slides.pptx
+++ b/REST/REST_workshop_compara_slides.pptx
@@ -234,7 +234,7 @@
           <a:p>
             <a:fld id="{AE13DEA4-EEE7-364D-82E0-654C71B13B07}" type="datetimeFigureOut">
               <a:rPr lang="en-US" smtClean="0"/>
-              <a:t>18/04/17</a:t>
+              <a:t>21/04/17</a:t>
             </a:fld>
             <a:endParaRPr lang="en-US"/>
           </a:p>
@@ -19609,31 +19609,8 @@
                   </a:solidFill>
                 </a:uFill>
               </a:rPr>
-              <a:t>106041480:</a:t>
-            </a:r>
-            <a:r>
-              <a:rPr lang="en-US" sz="2600" spc="-1" dirty="0" smtClean="0">
-                <a:solidFill>
-                  <a:srgbClr val="000080"/>
-                </a:solidFill>
-                <a:uFill>
-                  <a:solidFill>
-                    <a:srgbClr val="FFFFFF"/>
-                  </a:solidFill>
-                </a:uFill>
-              </a:rPr>
-              <a:t>1 </a:t>
-            </a:r>
-            <a:endParaRPr lang="en-US" sz="2600" spc="-1" dirty="0" smtClean="0">
-              <a:solidFill>
-                <a:srgbClr val="000080"/>
-              </a:solidFill>
-              <a:uFill>
-                <a:solidFill>
-                  <a:srgbClr val="FFFFFF"/>
-                </a:solidFill>
-              </a:uFill>
-            </a:endParaRPr>
+              <a:t>106041480:1 </a:t>
+            </a:r>
           </a:p>
           <a:p>
             <a:pPr marL="432000" indent="-324000">
@@ -19718,21 +19695,7 @@
                 </a:uFill>
                 <a:latin typeface="Arial"/>
               </a:rPr>
-              <a:t> format </a:t>
-            </a:r>
-            <a:r>
-              <a:rPr lang="en-US" sz="2600" b="0" strike="noStrike" spc="-1" dirty="0" smtClean="0">
-                <a:solidFill>
-                  <a:srgbClr val="000080"/>
-                </a:solidFill>
-                <a:uFill>
-                  <a:solidFill>
-                    <a:srgbClr val="FFFFFF"/>
-                  </a:solidFill>
-                </a:uFill>
-                <a:latin typeface="Arial"/>
-              </a:rPr>
-              <a:t>the aligned human </a:t>
+              <a:t> format the aligned human </a:t>
             </a:r>
             <a:r>
               <a:rPr lang="en-US" sz="2600" spc="-1" dirty="0" smtClean="0">
@@ -19967,16 +19930,6 @@
               </a:rPr>
               <a:t>.</a:t>
             </a:r>
-            <a:endParaRPr lang="en-US" sz="2600" spc="-1" dirty="0" smtClean="0">
-              <a:solidFill>
-                <a:srgbClr val="000080"/>
-              </a:solidFill>
-              <a:uFill>
-                <a:solidFill>
-                  <a:srgbClr val="FFFFFF"/>
-                </a:solidFill>
-              </a:uFill>
-            </a:endParaRPr>
           </a:p>
           <a:p>
             <a:pPr marL="432000" indent="-324000">
@@ -21572,31 +21525,8 @@
                   </a:solidFill>
                 </a:uFill>
               </a:rPr>
-              <a:t>“/family/id/</a:t>
-            </a:r>
-            <a:r>
-              <a:rPr lang="en-US" sz="2600" spc="-1" dirty="0" smtClean="0">
-                <a:solidFill>
-                  <a:srgbClr val="008000"/>
-                </a:solidFill>
-                <a:uFill>
-                  <a:solidFill>
-                    <a:srgbClr val="FFFFFF"/>
-                  </a:solidFill>
-                </a:uFill>
-              </a:rPr>
-              <a:t>PTHR15573”</a:t>
-            </a:r>
-            <a:endParaRPr lang="en-US" sz="2600" spc="-1" dirty="0" smtClean="0">
-              <a:solidFill>
-                <a:srgbClr val="008000"/>
-              </a:solidFill>
-              <a:uFill>
-                <a:solidFill>
-                  <a:srgbClr val="FFFFFF"/>
-                </a:solidFill>
-              </a:uFill>
-            </a:endParaRPr>
+              <a:t>“/family/id/PTHR15573”</a:t>
+            </a:r>
           </a:p>
           <a:p>
             <a:pPr marL="889200" lvl="1" indent="-324000">
@@ -22116,16 +22046,6 @@
               </a:rPr>
               <a:t>ENSG00000157764”</a:t>
             </a:r>
-            <a:endParaRPr lang="en-US" sz="2600" spc="-1" dirty="0" smtClean="0">
-              <a:solidFill>
-                <a:srgbClr val="008000"/>
-              </a:solidFill>
-              <a:uFill>
-                <a:solidFill>
-                  <a:srgbClr val="FFFFFF"/>
-                </a:solidFill>
-              </a:uFill>
-            </a:endParaRPr>
           </a:p>
           <a:p>
             <a:pPr marL="889200" lvl="1" indent="-324000">
@@ -23193,16 +23113,6 @@
               </a:rPr>
               <a:t>BRCA2”</a:t>
             </a:r>
-            <a:endParaRPr lang="pl-PL" sz="2600" spc="-1" dirty="0" smtClean="0">
-              <a:solidFill>
-                <a:srgbClr val="008000"/>
-              </a:solidFill>
-              <a:uFill>
-                <a:solidFill>
-                  <a:srgbClr val="FFFFFF"/>
-                </a:solidFill>
-              </a:uFill>
-            </a:endParaRPr>
           </a:p>
           <a:p>
             <a:pPr marL="889200" lvl="1" indent="-324000">
@@ -24305,20 +24215,7 @@
                   </a:solidFill>
                 </a:uFill>
               </a:rPr>
-              <a:t> sequences </a:t>
-            </a:r>
-            <a:r>
-              <a:rPr lang="en-US" sz="2600" spc="-1" dirty="0" smtClean="0">
-                <a:solidFill>
-                  <a:srgbClr val="000080"/>
-                </a:solidFill>
-                <a:uFill>
-                  <a:solidFill>
-                    <a:srgbClr val="FFFFFF"/>
-                  </a:solidFill>
-                </a:uFill>
-              </a:rPr>
-              <a:t>for only </a:t>
+              <a:t> sequences for only </a:t>
             </a:r>
             <a:r>
               <a:rPr lang="en-US" sz="2600" spc="-1" dirty="0">
@@ -26580,16 +26477,6 @@
               </a:rPr>
               <a:t>ENSGT00390000003602”</a:t>
             </a:r>
-            <a:endParaRPr lang="en-US" sz="2600" spc="-1" dirty="0" smtClean="0">
-              <a:solidFill>
-                <a:srgbClr val="008000"/>
-              </a:solidFill>
-              <a:uFill>
-                <a:solidFill>
-                  <a:srgbClr val="FFFFFF"/>
-                </a:solidFill>
-              </a:uFill>
-            </a:endParaRPr>
           </a:p>
           <a:p>
             <a:pPr marL="889200" lvl="1" indent="-324000">
@@ -27265,16 +27152,6 @@
               </a:rPr>
               <a:t>ENSG00000167664”</a:t>
             </a:r>
-            <a:endParaRPr lang="en-US" sz="2600" spc="-1" dirty="0" smtClean="0">
-              <a:solidFill>
-                <a:srgbClr val="008000"/>
-              </a:solidFill>
-              <a:uFill>
-                <a:solidFill>
-                  <a:srgbClr val="FFFFFF"/>
-                </a:solidFill>
-              </a:uFill>
-            </a:endParaRPr>
           </a:p>
           <a:p>
             <a:pPr marL="889200" lvl="1" indent="-324000">
@@ -28077,16 +27954,6 @@
               </a:rPr>
               <a:t>BRCA2”</a:t>
             </a:r>
-            <a:endParaRPr lang="pl-PL" sz="2600" spc="-1" dirty="0" smtClean="0">
-              <a:solidFill>
-                <a:srgbClr val="008000"/>
-              </a:solidFill>
-              <a:uFill>
-                <a:solidFill>
-                  <a:srgbClr val="FFFFFF"/>
-                </a:solidFill>
-              </a:uFill>
-            </a:endParaRPr>
           </a:p>
           <a:p>
             <a:pPr marL="889200" lvl="1" indent="-324000">
@@ -29228,21 +29095,7 @@
                 </a:uFill>
                 <a:latin typeface="Arial"/>
               </a:rPr>
-              <a:t>Identification and understanding of the distribution of highly conserved </a:t>
-            </a:r>
-            <a:r>
-              <a:rPr lang="en-US" sz="2600" b="0" strike="noStrike" spc="-1" dirty="0" smtClean="0">
-                <a:solidFill>
-                  <a:srgbClr val="000080"/>
-                </a:solidFill>
-                <a:uFill>
-                  <a:solidFill>
-                    <a:srgbClr val="FFFFFF"/>
-                  </a:solidFill>
-                </a:uFill>
-                <a:latin typeface="Arial"/>
-              </a:rPr>
-              <a:t>regions leads to better understanding of the genome.</a:t>
+              <a:t>Identification and understanding of the distribution of highly conserved regions leads to better understanding of the genome.</a:t>
             </a:r>
           </a:p>
           <a:p>
@@ -29399,7 +29252,7 @@
         </p:nvSpPr>
         <p:spPr>
           <a:xfrm>
-            <a:off x="504000" y="302760"/>
+            <a:off x="504000" y="80528"/>
             <a:ext cx="9071640" cy="1259640"/>
           </a:xfrm>
           <a:prstGeom prst="rect">
@@ -29426,7 +29279,35 @@
                 </a:uFill>
                 <a:latin typeface="Arial"/>
               </a:rPr>
-              <a:t>Exercises - </a:t>
+              <a:t>Exercises </a:t>
+            </a:r>
+            <a:r>
+              <a:rPr lang="en-US" sz="3970" b="0" i="1" strike="noStrike" spc="-1" dirty="0" smtClean="0">
+                <a:solidFill>
+                  <a:srgbClr val="800000"/>
+                </a:solidFill>
+                <a:uFill>
+                  <a:solidFill>
+                    <a:srgbClr val="FFFFFF"/>
+                  </a:solidFill>
+                </a:uFill>
+                <a:latin typeface="Arial"/>
+              </a:rPr>
+              <a:t>–</a:t>
+            </a:r>
+            <a:r>
+              <a:rPr lang="en-GB" sz="3970" b="0" i="1" strike="noStrike" spc="-1" dirty="0" smtClean="0">
+                <a:solidFill>
+                  <a:srgbClr val="800000"/>
+                </a:solidFill>
+                <a:uFill>
+                  <a:solidFill>
+                    <a:srgbClr val="FFFFFF"/>
+                  </a:solidFill>
+                </a:uFill>
+                <a:latin typeface="Arial"/>
+              </a:rPr>
+              <a:t> </a:t>
             </a:r>
             <a:r>
               <a:rPr lang="en-GB" sz="3970" b="0" i="1" strike="noStrike" spc="-1" dirty="0" err="1" smtClean="0">
@@ -29442,7 +29323,64 @@
               </a:rPr>
               <a:t>GeneTree</a:t>
             </a:r>
-            <a:endParaRPr lang="en-US" sz="3970" b="0" i="1" strike="noStrike" spc="-1" dirty="0">
+            <a:endParaRPr lang="en-GB" sz="3970" b="0" i="1" strike="noStrike" spc="-1" dirty="0" smtClean="0">
+              <a:solidFill>
+                <a:srgbClr val="800000"/>
+              </a:solidFill>
+              <a:uFill>
+                <a:solidFill>
+                  <a:srgbClr val="FFFFFF"/>
+                </a:solidFill>
+              </a:uFill>
+              <a:latin typeface="Arial"/>
+            </a:endParaRPr>
+          </a:p>
+          <a:p>
+            <a:r>
+              <a:rPr lang="en-GB" sz="2800" i="1" spc="-1" dirty="0" smtClean="0">
+                <a:solidFill>
+                  <a:srgbClr val="800000"/>
+                </a:solidFill>
+                <a:uFill>
+                  <a:solidFill>
+                    <a:srgbClr val="FFFFFF"/>
+                  </a:solidFill>
+                </a:uFill>
+                <a:latin typeface="Arial"/>
+              </a:rPr>
+              <a:t>NB: online tree viewer -&gt; </a:t>
+            </a:r>
+            <a:r>
+              <a:rPr lang="da-DK" sz="2800" u="sng" dirty="0"/>
+              <a:t>http://</a:t>
+            </a:r>
+            <a:r>
+              <a:rPr lang="da-DK" sz="2800" u="sng" dirty="0" err="1"/>
+              <a:t>itol.embl.de</a:t>
+            </a:r>
+            <a:r>
+              <a:rPr lang="da-DK" sz="2800" u="sng" dirty="0"/>
+              <a:t>/</a:t>
+            </a:r>
+            <a:r>
+              <a:rPr lang="da-DK" sz="2800" u="sng" dirty="0" err="1"/>
+              <a:t>upload.cgi</a:t>
+            </a:r>
+            <a:r>
+              <a:rPr lang="en-GB" sz="2800" i="1" spc="-1" dirty="0" smtClean="0">
+                <a:solidFill>
+                  <a:srgbClr val="800000"/>
+                </a:solidFill>
+                <a:uFill>
+                  <a:solidFill>
+                    <a:srgbClr val="FFFFFF"/>
+                  </a:solidFill>
+                </a:uFill>
+                <a:latin typeface="Arial"/>
+              </a:rPr>
+              <a:t> </a:t>
+            </a:r>
+            <a:endParaRPr lang="en-US" sz="2800" b="0" i="1" strike="noStrike" spc="-1" dirty="0">
               <a:solidFill>
                 <a:srgbClr val="800000"/>
               </a:solidFill>
@@ -29464,8 +29402,8 @@
         </p:nvSpPr>
         <p:spPr>
           <a:xfrm>
-            <a:off x="504000" y="1205520"/>
-            <a:ext cx="8496000" cy="5731306"/>
+            <a:off x="504000" y="1495840"/>
+            <a:ext cx="8496000" cy="5399273"/>
           </a:xfrm>
           <a:prstGeom prst="rect">
             <a:avLst/>
@@ -29735,7 +29673,21 @@
                 </a:uFill>
                 <a:latin typeface="Arial"/>
               </a:rPr>
-              <a:t>2: Get the gene </a:t>
+              <a:t>2: Get the gene tree predicted </a:t>
+            </a:r>
+            <a:r>
+              <a:rPr lang="en-US" sz="2600" b="0" strike="noStrike" spc="-1" dirty="0">
+                <a:solidFill>
+                  <a:srgbClr val="000080"/>
+                </a:solidFill>
+                <a:uFill>
+                  <a:solidFill>
+                    <a:srgbClr val="FFFFFF"/>
+                  </a:solidFill>
+                </a:uFill>
+                <a:latin typeface="Arial"/>
+              </a:rPr>
+              <a:t>for the </a:t>
             </a:r>
             <a:r>
               <a:rPr lang="en-US" sz="2600" b="0" strike="noStrike" spc="-1" dirty="0" smtClean="0">
@@ -29749,48 +29701,6 @@
                 </a:uFill>
                 <a:latin typeface="Arial"/>
               </a:rPr>
-              <a:t>tree </a:t>
-            </a:r>
-            <a:r>
-              <a:rPr lang="en-US" sz="2600" b="0" strike="noStrike" spc="-1" dirty="0" smtClean="0">
-                <a:solidFill>
-                  <a:srgbClr val="000080"/>
-                </a:solidFill>
-                <a:uFill>
-                  <a:solidFill>
-                    <a:srgbClr val="FFFFFF"/>
-                  </a:solidFill>
-                </a:uFill>
-                <a:latin typeface="Arial"/>
-              </a:rPr>
-              <a:t>predicted </a:t>
-            </a:r>
-            <a:r>
-              <a:rPr lang="en-US" sz="2600" b="0" strike="noStrike" spc="-1" dirty="0">
-                <a:solidFill>
-                  <a:srgbClr val="000080"/>
-                </a:solidFill>
-                <a:uFill>
-                  <a:solidFill>
-                    <a:srgbClr val="FFFFFF"/>
-                  </a:solidFill>
-                </a:uFill>
-                <a:latin typeface="Arial"/>
-              </a:rPr>
-              <a:t>for the </a:t>
-            </a:r>
-            <a:r>
-              <a:rPr lang="en-US" sz="2600" b="0" strike="noStrike" spc="-1" dirty="0" smtClean="0">
-                <a:solidFill>
-                  <a:srgbClr val="000080"/>
-                </a:solidFill>
-                <a:uFill>
-                  <a:solidFill>
-                    <a:srgbClr val="FFFFFF"/>
-                  </a:solidFill>
-                </a:uFill>
-                <a:latin typeface="Arial"/>
-              </a:rPr>
               <a:t>gene </a:t>
             </a:r>
             <a:r>
@@ -29832,16 +29742,6 @@
               </a:rPr>
               <a:t> format. </a:t>
             </a:r>
-            <a:endParaRPr lang="en-US" sz="2600" spc="-1" dirty="0" smtClean="0">
-              <a:solidFill>
-                <a:srgbClr val="000080"/>
-              </a:solidFill>
-              <a:uFill>
-                <a:solidFill>
-                  <a:srgbClr val="FFFFFF"/>
-                </a:solidFill>
-              </a:uFill>
-            </a:endParaRPr>
           </a:p>
           <a:p>
             <a:pPr marL="432000" indent="-324000">
@@ -29910,72 +29810,7 @@
                   </a:solidFill>
                 </a:uFill>
               </a:rPr>
-              <a:t>gene </a:t>
-            </a:r>
-            <a:r>
-              <a:rPr lang="en-US" sz="2600" spc="-1" dirty="0" smtClean="0">
-                <a:solidFill>
-                  <a:srgbClr val="000080"/>
-                </a:solidFill>
-                <a:uFill>
-                  <a:solidFill>
-                    <a:srgbClr val="FFFFFF"/>
-                  </a:solidFill>
-                </a:uFill>
-              </a:rPr>
-              <a:t>tree </a:t>
-            </a:r>
-            <a:r>
-              <a:rPr lang="en-US" sz="2600" spc="-1" dirty="0" smtClean="0">
-                <a:solidFill>
-                  <a:srgbClr val="000080"/>
-                </a:solidFill>
-                <a:uFill>
-                  <a:solidFill>
-                    <a:srgbClr val="FFFFFF"/>
-                  </a:solidFill>
-                </a:uFill>
-              </a:rPr>
-              <a:t>predicted for the </a:t>
-            </a:r>
-            <a:r>
-              <a:rPr lang="en-US" sz="2600" spc="-1" dirty="0" smtClean="0">
-                <a:solidFill>
-                  <a:srgbClr val="000080"/>
-                </a:solidFill>
-                <a:uFill>
-                  <a:solidFill>
-                    <a:srgbClr val="FFFFFF"/>
-                  </a:solidFill>
-                </a:uFill>
-              </a:rPr>
-              <a:t>human gene </a:t>
-            </a:r>
-            <a:r>
-              <a:rPr lang="en-US" sz="2600" spc="-1" dirty="0" smtClean="0">
-                <a:solidFill>
-                  <a:srgbClr val="000080"/>
-                </a:solidFill>
-                <a:uFill>
-                  <a:solidFill>
-                    <a:srgbClr val="FFFFFF"/>
-                  </a:solidFill>
-                </a:uFill>
-              </a:rPr>
-              <a:t>with the symbol HOXD4-</a:t>
-            </a:r>
-            <a:r>
-              <a:rPr lang="en-US" sz="2600" spc="-1" dirty="0" smtClean="0">
-                <a:solidFill>
-                  <a:srgbClr val="000080"/>
-                </a:solidFill>
-                <a:uFill>
-                  <a:solidFill>
-                    <a:srgbClr val="FFFFFF"/>
-                  </a:solidFill>
-                </a:uFill>
-              </a:rPr>
-              <a:t>001 in simple </a:t>
+              <a:t>gene tree predicted for the human gene with the symbol HOXD4-001 in simple </a:t>
             </a:r>
             <a:r>
               <a:rPr lang="en-US" sz="2600" spc="-1" dirty="0" err="1" smtClean="0">
@@ -31257,16 +31092,6 @@
               </a:rPr>
               <a:t>ENSGT00390000003602”</a:t>
             </a:r>
-            <a:endParaRPr lang="en-US" sz="2600" spc="-1" dirty="0" smtClean="0">
-              <a:solidFill>
-                <a:srgbClr val="008000"/>
-              </a:solidFill>
-              <a:uFill>
-                <a:solidFill>
-                  <a:srgbClr val="FFFFFF"/>
-                </a:solidFill>
-              </a:uFill>
-            </a:endParaRPr>
           </a:p>
           <a:p>
             <a:pPr marL="889200" lvl="1" indent="-324000">
@@ -31973,16 +31798,6 @@
               </a:rPr>
               <a:t>ENSG00000167664”</a:t>
             </a:r>
-            <a:endParaRPr lang="en-US" sz="2600" spc="-1" dirty="0" smtClean="0">
-              <a:solidFill>
-                <a:srgbClr val="008000"/>
-              </a:solidFill>
-              <a:uFill>
-                <a:solidFill>
-                  <a:srgbClr val="FFFFFF"/>
-                </a:solidFill>
-              </a:uFill>
-            </a:endParaRPr>
           </a:p>
           <a:p>
             <a:pPr marL="889200" lvl="1" indent="-324000">
@@ -32775,16 +32590,6 @@
               </a:rPr>
               <a:t>BRCA2”</a:t>
             </a:r>
-            <a:endParaRPr lang="pl-PL" sz="2600" spc="-1" dirty="0" smtClean="0">
-              <a:solidFill>
-                <a:srgbClr val="008000"/>
-              </a:solidFill>
-              <a:uFill>
-                <a:solidFill>
-                  <a:srgbClr val="FFFFFF"/>
-                </a:solidFill>
-              </a:uFill>
-            </a:endParaRPr>
           </a:p>
           <a:p>
             <a:pPr marL="889200" lvl="1" indent="-324000">
@@ -33183,20 +32988,7 @@
                   </a:solidFill>
                 </a:uFill>
               </a:rPr>
-              <a:t> format</a:t>
-            </a:r>
-            <a:r>
-              <a:rPr lang="en-US" sz="2600" spc="-1" dirty="0" smtClean="0">
-                <a:solidFill>
-                  <a:srgbClr val="000080"/>
-                </a:solidFill>
-                <a:uFill>
-                  <a:solidFill>
-                    <a:srgbClr val="FFFFFF"/>
-                  </a:solidFill>
-                </a:uFill>
-              </a:rPr>
-              <a:t>.</a:t>
+              <a:t> format.</a:t>
             </a:r>
             <a:endParaRPr lang="en-US" sz="2600" b="0" strike="noStrike" spc="-1" dirty="0" smtClean="0">
               <a:solidFill>
@@ -33272,35 +33064,7 @@
                 </a:uFill>
                 <a:latin typeface="Arial"/>
               </a:rPr>
-              <a:t>gene </a:t>
-            </a:r>
-            <a:r>
-              <a:rPr lang="en-US" sz="2600" b="0" strike="noStrike" spc="-1" dirty="0" smtClean="0">
-                <a:solidFill>
-                  <a:srgbClr val="000080"/>
-                </a:solidFill>
-                <a:uFill>
-                  <a:solidFill>
-                    <a:srgbClr val="FFFFFF"/>
-                  </a:solidFill>
-                </a:uFill>
-                <a:latin typeface="Arial"/>
-              </a:rPr>
-              <a:t>tree </a:t>
-            </a:r>
-            <a:r>
-              <a:rPr lang="en-US" sz="2600" b="0" strike="noStrike" spc="-1" dirty="0" smtClean="0">
-                <a:solidFill>
-                  <a:srgbClr val="000080"/>
-                </a:solidFill>
-                <a:uFill>
-                  <a:solidFill>
-                    <a:srgbClr val="FFFFFF"/>
-                  </a:solidFill>
-                </a:uFill>
-                <a:latin typeface="Arial"/>
-              </a:rPr>
-              <a:t>predicted </a:t>
+              <a:t>gene tree predicted </a:t>
             </a:r>
             <a:r>
               <a:rPr lang="en-US" sz="2600" b="0" strike="noStrike" spc="-1" dirty="0">
@@ -33437,85 +33201,7 @@
                   </a:solidFill>
                 </a:uFill>
               </a:rPr>
-              <a:t>3: Get the cafe tree </a:t>
-            </a:r>
-            <a:r>
-              <a:rPr lang="en-US" sz="2600" spc="-1" dirty="0" smtClean="0">
-                <a:solidFill>
-                  <a:srgbClr val="000080"/>
-                </a:solidFill>
-                <a:uFill>
-                  <a:solidFill>
-                    <a:srgbClr val="FFFFFF"/>
-                  </a:solidFill>
-                </a:uFill>
-              </a:rPr>
-              <a:t>information for the </a:t>
-            </a:r>
-            <a:r>
-              <a:rPr lang="en-US" sz="2600" spc="-1" dirty="0" smtClean="0">
-                <a:solidFill>
-                  <a:srgbClr val="000080"/>
-                </a:solidFill>
-                <a:uFill>
-                  <a:solidFill>
-                    <a:srgbClr val="FFFFFF"/>
-                  </a:solidFill>
-                </a:uFill>
-              </a:rPr>
-              <a:t>gene </a:t>
-            </a:r>
-            <a:r>
-              <a:rPr lang="en-US" sz="2600" spc="-1" dirty="0" smtClean="0">
-                <a:solidFill>
-                  <a:srgbClr val="000080"/>
-                </a:solidFill>
-                <a:uFill>
-                  <a:solidFill>
-                    <a:srgbClr val="FFFFFF"/>
-                  </a:solidFill>
-                </a:uFill>
-              </a:rPr>
-              <a:t>tree </a:t>
-            </a:r>
-            <a:r>
-              <a:rPr lang="en-US" sz="2600" spc="-1" dirty="0" smtClean="0">
-                <a:solidFill>
-                  <a:srgbClr val="000080"/>
-                </a:solidFill>
-                <a:uFill>
-                  <a:solidFill>
-                    <a:srgbClr val="FFFFFF"/>
-                  </a:solidFill>
-                </a:uFill>
-              </a:rPr>
-              <a:t>predicted for the </a:t>
-            </a:r>
-            <a:r>
-              <a:rPr lang="en-US" sz="2600" spc="-1" dirty="0" smtClean="0">
-                <a:solidFill>
-                  <a:srgbClr val="000080"/>
-                </a:solidFill>
-                <a:uFill>
-                  <a:solidFill>
-                    <a:srgbClr val="FFFFFF"/>
-                  </a:solidFill>
-                </a:uFill>
-              </a:rPr>
-              <a:t>human gene </a:t>
-            </a:r>
-            <a:r>
-              <a:rPr lang="en-US" sz="2600" spc="-1" dirty="0" smtClean="0">
-                <a:solidFill>
-                  <a:srgbClr val="000080"/>
-                </a:solidFill>
-                <a:uFill>
-                  <a:solidFill>
-                    <a:srgbClr val="FFFFFF"/>
-                  </a:solidFill>
-                </a:uFill>
-              </a:rPr>
-              <a:t>with the symbol HOXD4-001</a:t>
+              <a:t>3: Get the cafe tree information for the gene tree predicted for the human gene with the symbol HOXD4-001</a:t>
             </a:r>
             <a:endParaRPr lang="en-US" sz="2600" b="0" strike="noStrike" spc="-1" dirty="0">
               <a:solidFill>
@@ -34292,16 +33978,6 @@
               </a:rPr>
               <a:t>ENSG00000157764”</a:t>
             </a:r>
-            <a:endParaRPr lang="en-US" sz="2600" spc="-1" dirty="0" smtClean="0">
-              <a:solidFill>
-                <a:srgbClr val="008000"/>
-              </a:solidFill>
-              <a:uFill>
-                <a:solidFill>
-                  <a:srgbClr val="FFFFFF"/>
-                </a:solidFill>
-              </a:uFill>
-            </a:endParaRPr>
           </a:p>
           <a:p>
             <a:pPr marL="889200" lvl="1" indent="-324000">
@@ -34976,16 +34652,6 @@
               </a:rPr>
               <a:t>BRCA2”</a:t>
             </a:r>
-            <a:endParaRPr lang="pl-PL" sz="2600" spc="-1" dirty="0" smtClean="0">
-              <a:solidFill>
-                <a:srgbClr val="008000"/>
-              </a:solidFill>
-              <a:uFill>
-                <a:solidFill>
-                  <a:srgbClr val="FFFFFF"/>
-                </a:solidFill>
-              </a:uFill>
-            </a:endParaRPr>
           </a:p>
           <a:p>
             <a:pPr marL="889200" lvl="1" indent="-324000">
@@ -36566,20 +36232,7 @@
                   </a:solidFill>
                 </a:uFill>
               </a:rPr>
-              <a:t>2: Get </a:t>
-            </a:r>
-            <a:r>
-              <a:rPr lang="en-US" sz="2600" spc="-1" dirty="0" smtClean="0">
-                <a:solidFill>
-                  <a:srgbClr val="000080"/>
-                </a:solidFill>
-                <a:uFill>
-                  <a:solidFill>
-                    <a:srgbClr val="FFFFFF"/>
-                  </a:solidFill>
-                </a:uFill>
-              </a:rPr>
-              <a:t>all the </a:t>
+              <a:t>2: Get all the </a:t>
             </a:r>
             <a:r>
               <a:rPr lang="en-US" sz="2600" spc="-1" dirty="0" err="1" smtClean="0">

</xml_diff>